<commit_message>
2019.06.17 Github 연결 방법 , AWS 웹서버 구축 하기
</commit_message>
<xml_diff>
--- a/AWS.pptx
+++ b/AWS.pptx
@@ -9,7 +9,7 @@
     <p:sldId id="257" r:id="rId3"/>
     <p:sldId id="259" r:id="rId4"/>
     <p:sldId id="260" r:id="rId5"/>
-    <p:sldId id="261" r:id="rId6"/>
+    <p:sldId id="263" r:id="rId6"/>
     <p:sldId id="262" r:id="rId7"/>
   </p:sldIdLst>
   <p:sldSz cx="12192000" cy="6858000"/>
@@ -109,6 +109,11 @@
       </a:defRPr>
     </a:lvl9pPr>
   </p:defaultTextStyle>
+  <p:extLst>
+    <p:ext uri="{EFAFB233-063F-42B5-8137-9DF3F51BA10A}">
+      <p15:sldGuideLst xmlns:p15="http://schemas.microsoft.com/office/powerpoint/2012/main"/>
+    </p:ext>
+  </p:extLst>
 </p:presentation>
 </file>
 
@@ -3376,7 +3381,7 @@
           <a:bodyPr/>
           <a:lstStyle/>
           <a:p>
-            <a:endParaRPr lang="ko-KR" altLang="en-US"/>
+            <a:endParaRPr lang="ko-KR" altLang="en-US" dirty="0"/>
           </a:p>
         </p:txBody>
       </p:sp>
@@ -3456,7 +3461,9 @@
         </p:nvSpPr>
         <p:spPr/>
         <p:txBody>
-          <a:bodyPr/>
+          <a:bodyPr>
+            <a:normAutofit/>
+          </a:bodyPr>
           <a:lstStyle/>
           <a:p>
             <a:r>
@@ -3474,6 +3481,34 @@
             <a:r>
               <a:rPr lang="en-US" altLang="ko-KR" dirty="0"/>
               <a:t>.</a:t>
+            </a:r>
+          </a:p>
+          <a:p>
+            <a:endParaRPr lang="en-US" altLang="ko-KR" dirty="0"/>
+          </a:p>
+          <a:p>
+            <a:endParaRPr lang="en-US" altLang="ko-KR" dirty="0"/>
+          </a:p>
+          <a:p>
+            <a:endParaRPr lang="en-US" altLang="ko-KR" dirty="0"/>
+          </a:p>
+          <a:p>
+            <a:r>
+              <a:rPr lang="ko-KR" altLang="en-US" dirty="0"/>
+              <a:t>참고 강의</a:t>
+            </a:r>
+            <a:endParaRPr lang="en-US" altLang="ko-KR" dirty="0"/>
+          </a:p>
+          <a:p>
+            <a:r>
+              <a:rPr lang="en-US" altLang="ko-KR" dirty="0">
+                <a:hlinkClick r:id="rId2"/>
+              </a:rPr>
+              <a:t>https://www.youtube.com/watch?v=7ThkvfCKKQs&amp;list=PLuHgQVnccGMC5AYnBg8ffg5utOLwEj4fZ&amp;index=1</a:t>
+            </a:r>
+            <a:r>
+              <a:rPr lang="en-US" altLang="ko-KR" dirty="0"/>
+              <a:t> </a:t>
             </a:r>
             <a:endParaRPr lang="ko-KR" altLang="en-US" dirty="0"/>
           </a:p>
@@ -3663,38 +3698,169 @@
         </p:nvSpPr>
         <p:spPr/>
         <p:txBody>
-          <a:bodyPr/>
-          <a:lstStyle/>
-          <a:p>
+          <a:bodyPr>
+            <a:normAutofit/>
+          </a:bodyPr>
+          <a:lstStyle/>
+          <a:p>
+            <a:r>
+              <a:rPr lang="en-US" altLang="ko-KR" dirty="0" err="1"/>
+              <a:t>xShell</a:t>
+            </a:r>
+            <a:r>
+              <a:rPr lang="ko-KR" altLang="en-US" dirty="0"/>
+              <a:t> 랑 같은 </a:t>
+            </a:r>
             <a:r>
               <a:rPr lang="en-US" altLang="ko-KR" dirty="0"/>
-              <a:t>Putty </a:t>
-            </a:r>
-            <a:r>
-              <a:rPr lang="ko-KR" altLang="en-US" dirty="0"/>
-              <a:t>랑 같은 </a:t>
-            </a:r>
+              <a:t>git Bash </a:t>
+            </a:r>
+          </a:p>
+          <a:p>
+            <a:pPr lvl="1"/>
+            <a:r>
+              <a:rPr lang="ko-KR" altLang="en-US" sz="1600" dirty="0"/>
+              <a:t>개인용 컴퓨터를 처리장치에 연결된 터미널처럼 사용할 수 있도록 해주는 기능으로 한 장치를 별종의 호스트 컴퓨터의 터미널로 보이게 하여 사용하는 것</a:t>
+            </a:r>
+            <a:r>
+              <a:rPr lang="en-US" altLang="ko-KR" sz="1600" dirty="0"/>
+              <a:t>. </a:t>
+            </a:r>
+            <a:r>
+              <a:rPr lang="ko-KR" altLang="en-US" sz="1600" dirty="0"/>
+              <a:t>많은 경우 </a:t>
+            </a:r>
+            <a:r>
+              <a:rPr lang="en-US" altLang="ko-KR" sz="1600" dirty="0"/>
+              <a:t>PC</a:t>
+            </a:r>
+            <a:r>
+              <a:rPr lang="ko-KR" altLang="en-US" sz="1600" dirty="0"/>
+              <a:t>상에서 프로그램을 달리게 하는 것에 의해 에뮬레이션을 행함</a:t>
+            </a:r>
+            <a:r>
+              <a:rPr lang="en-US" altLang="ko-KR" sz="1600" dirty="0"/>
+              <a:t>. </a:t>
+            </a:r>
+            <a:r>
+              <a:rPr lang="ko-KR" altLang="en-US" sz="1600" dirty="0"/>
+              <a:t>이 프로그램을 터미널 </a:t>
+            </a:r>
+            <a:r>
+              <a:rPr lang="ko-KR" altLang="en-US" sz="1600" dirty="0">
+                <a:hlinkClick r:id="rId2"/>
+              </a:rPr>
+              <a:t>에뮬레이터</a:t>
+            </a:r>
+            <a:r>
+              <a:rPr lang="ko-KR" altLang="en-US" sz="1600" dirty="0"/>
+              <a:t>라고 함</a:t>
+            </a:r>
+            <a:r>
+              <a:rPr lang="en-US" altLang="ko-KR" sz="1600" dirty="0"/>
+              <a:t>. IBM 3270 </a:t>
+            </a:r>
+            <a:r>
+              <a:rPr lang="ko-KR" altLang="en-US" sz="1600" dirty="0"/>
+              <a:t>에뮬레이터가 최근에는 </a:t>
+            </a:r>
+            <a:r>
+              <a:rPr lang="en-US" altLang="ko-KR" sz="1600" dirty="0"/>
+              <a:t>LAN </a:t>
+            </a:r>
+            <a:r>
+              <a:rPr lang="ko-KR" altLang="en-US" sz="1600" dirty="0"/>
+              <a:t>대응의 에뮬레이터도 등장하고 있고 그들 중에서는 </a:t>
+            </a:r>
+            <a:r>
+              <a:rPr lang="en-US" altLang="ko-KR" sz="1600" dirty="0"/>
+              <a:t>Windows</a:t>
+            </a:r>
+            <a:r>
+              <a:rPr lang="ko-KR" altLang="en-US" sz="1600" dirty="0"/>
+              <a:t>에 대응하는 것으로 호스트와의 </a:t>
+            </a:r>
+            <a:r>
+              <a:rPr lang="ko-KR" altLang="en-US" sz="1600" dirty="0">
+                <a:hlinkClick r:id="rId3"/>
+              </a:rPr>
+              <a:t>데이터</a:t>
+            </a:r>
+            <a:r>
+              <a:rPr lang="ko-KR" altLang="en-US" sz="1600" dirty="0"/>
+              <a:t> 연계를 용의하게 하는 제품도 늘고 있음</a:t>
+            </a:r>
+            <a:r>
+              <a:rPr lang="en-US" altLang="ko-KR" sz="1600" dirty="0"/>
+              <a:t>. </a:t>
+            </a:r>
+            <a:r>
+              <a:rPr lang="ko-KR" altLang="en-US" sz="1600" dirty="0"/>
+              <a:t>에뮬레이터 대상의 터미널에서 표시가능한 문자수가 표시되지 않거나 일부의 전송제어 순서가 사용할 수 없는 경우가 있는 등 전용 단말에 비교하면 얼마간의 제약도 있음</a:t>
+            </a:r>
+            <a:r>
+              <a:rPr lang="en-US" altLang="ko-KR" sz="1600" b="1" dirty="0"/>
+              <a:t>[</a:t>
+            </a:r>
+            <a:r>
+              <a:rPr lang="ko-KR" altLang="en-US" sz="1600" b="1" dirty="0"/>
+              <a:t>네이버 지식백과</a:t>
+            </a:r>
+            <a:r>
+              <a:rPr lang="en-US" altLang="ko-KR" sz="1600" b="1" dirty="0"/>
+              <a:t>]</a:t>
+            </a:r>
+            <a:r>
+              <a:rPr lang="ko-KR" altLang="en-US" sz="1600" dirty="0"/>
+              <a:t> </a:t>
+            </a:r>
+            <a:r>
+              <a:rPr lang="ko-KR" altLang="en-US" sz="1600" dirty="0">
+                <a:hlinkClick r:id="rId4"/>
+              </a:rPr>
+              <a:t>터미널 에뮬레이션</a:t>
+            </a:r>
+            <a:r>
+              <a:rPr lang="ko-KR" altLang="en-US" sz="1600" dirty="0"/>
+              <a:t> </a:t>
+            </a:r>
+            <a:r>
+              <a:rPr lang="en-US" altLang="ko-KR" sz="1600" dirty="0"/>
+              <a:t>[Terminal emulation] (ITS </a:t>
+            </a:r>
+            <a:r>
+              <a:rPr lang="ko-KR" altLang="en-US" sz="1600" dirty="0"/>
+              <a:t>용어사전</a:t>
+            </a:r>
+            <a:r>
+              <a:rPr lang="en-US" altLang="ko-KR" sz="1600" dirty="0"/>
+              <a:t>, 2010., </a:t>
+            </a:r>
+            <a:r>
+              <a:rPr lang="ko-KR" altLang="en-US" sz="1600" dirty="0"/>
+              <a:t>국토교통부</a:t>
+            </a:r>
+            <a:r>
+              <a:rPr lang="en-US" altLang="ko-KR" sz="1600" dirty="0"/>
+              <a:t>)</a:t>
+            </a:r>
+          </a:p>
+          <a:p>
+            <a:pPr lvl="1"/>
+            <a:endParaRPr lang="en-US" altLang="ko-KR" sz="1600" dirty="0"/>
+          </a:p>
+          <a:p>
+            <a:endParaRPr lang="en-US" altLang="ko-KR" dirty="0"/>
+          </a:p>
+          <a:p>
             <a:r>
               <a:rPr lang="en-US" altLang="ko-KR" dirty="0" err="1"/>
-              <a:t>ssh</a:t>
+              <a:t>Sudo</a:t>
             </a:r>
             <a:r>
               <a:rPr lang="en-US" altLang="ko-KR" dirty="0"/>
               <a:t> </a:t>
             </a:r>
-          </a:p>
-          <a:p>
-            <a:endParaRPr lang="en-US" altLang="ko-KR" dirty="0"/>
-          </a:p>
-          <a:p>
-            <a:r>
-              <a:rPr lang="en-US" altLang="ko-KR" dirty="0" err="1"/>
-              <a:t>Sudo</a:t>
-            </a:r>
-            <a:r>
-              <a:rPr lang="en-US" altLang="ko-KR" dirty="0"/>
-              <a:t> </a:t>
-            </a:r>
             <a:r>
               <a:rPr lang="ko-KR" altLang="en-US" dirty="0"/>
               <a:t>명령어를 사용하여 </a:t>
@@ -3708,12 +3874,8 @@
               <a:t>한다</a:t>
             </a:r>
             <a:r>
-              <a:rPr lang="en-US" altLang="ko-KR"/>
-              <a:t>. </a:t>
-            </a:r>
-            <a:r>
               <a:rPr lang="en-US" altLang="ko-KR" dirty="0"/>
-              <a:t>Apache, </a:t>
+              <a:t>. Apache, </a:t>
             </a:r>
             <a:r>
               <a:rPr lang="en-US" altLang="ko-KR" dirty="0" err="1"/>
@@ -3762,7 +3924,7 @@
           <p:cNvPr id="2" name="제목 1">
             <a:extLst>
               <a:ext uri="{FF2B5EF4-FFF2-40B4-BE49-F238E27FC236}">
-                <a16:creationId xmlns:a16="http://schemas.microsoft.com/office/drawing/2014/main" id="{0459CF5C-DC26-49BE-BEC1-57C3D668FAD3}"/>
+                <a16:creationId xmlns:a16="http://schemas.microsoft.com/office/drawing/2014/main" id="{FF47194F-F7EA-4B32-89FF-86AF0637299F}"/>
               </a:ext>
             </a:extLst>
           </p:cNvPr>
@@ -3778,39 +3940,81 @@
           <a:bodyPr/>
           <a:lstStyle/>
           <a:p>
+            <a:r>
+              <a:rPr lang="en-US" altLang="ko-KR" dirty="0"/>
+              <a:t>Windows</a:t>
+            </a:r>
+            <a:r>
+              <a:rPr lang="ko-KR" altLang="en-US" dirty="0"/>
+              <a:t>에서 리눅스 인스턴스로 접속 </a:t>
+            </a:r>
+            <a:br>
+              <a:rPr lang="en-US" altLang="ko-KR" dirty="0"/>
+            </a:br>
+            <a:r>
+              <a:rPr lang="ko-KR" altLang="en-US" dirty="0"/>
+              <a:t>방법</a:t>
+            </a:r>
+          </a:p>
+        </p:txBody>
+      </p:sp>
+      <p:sp>
+        <p:nvSpPr>
+          <p:cNvPr id="3" name="내용 개체 틀 2">
+            <a:extLst>
+              <a:ext uri="{FF2B5EF4-FFF2-40B4-BE49-F238E27FC236}">
+                <a16:creationId xmlns:a16="http://schemas.microsoft.com/office/drawing/2014/main" id="{9F3FDF67-04EB-43DB-8237-28BF149F8D0F}"/>
+              </a:ext>
+            </a:extLst>
+          </p:cNvPr>
+          <p:cNvSpPr>
+            <a:spLocks noGrp="1"/>
+          </p:cNvSpPr>
+          <p:nvPr>
+            <p:ph idx="1"/>
+          </p:nvPr>
+        </p:nvSpPr>
+        <p:spPr/>
+        <p:txBody>
+          <a:bodyPr/>
+          <a:lstStyle/>
+          <a:p>
+            <a:pPr marL="0" indent="0">
+              <a:buNone/>
+            </a:pPr>
+            <a:endParaRPr lang="en-US" altLang="ko-KR" dirty="0"/>
+          </a:p>
+          <a:p>
+            <a:endParaRPr lang="en-US" altLang="ko-KR" dirty="0"/>
+          </a:p>
+          <a:p>
+            <a:endParaRPr lang="en-US" altLang="ko-KR" dirty="0"/>
+          </a:p>
+          <a:p>
+            <a:r>
+              <a:rPr lang="ko-KR" altLang="en-US" dirty="0"/>
+              <a:t>참고 강의</a:t>
+            </a:r>
+            <a:endParaRPr lang="en-US" altLang="ko-KR" dirty="0"/>
+          </a:p>
+          <a:p>
+            <a:endParaRPr lang="en-US" altLang="ko-KR" dirty="0"/>
+          </a:p>
+          <a:p>
+            <a:r>
+              <a:rPr lang="en-US" altLang="ko-KR" dirty="0">
+                <a:hlinkClick r:id="rId2"/>
+              </a:rPr>
+              <a:t>https://www.youtube.com/watch?v=fpkFp8QI4Cw&amp;list=PLuHgQVnccGMC5AYnBg8ffg5utOLwEj4fZ&amp;index=12</a:t>
+            </a:r>
             <a:endParaRPr lang="ko-KR" altLang="en-US" dirty="0"/>
-          </a:p>
-        </p:txBody>
-      </p:sp>
-      <p:sp>
-        <p:nvSpPr>
-          <p:cNvPr id="3" name="내용 개체 틀 2">
-            <a:extLst>
-              <a:ext uri="{FF2B5EF4-FFF2-40B4-BE49-F238E27FC236}">
-                <a16:creationId xmlns:a16="http://schemas.microsoft.com/office/drawing/2014/main" id="{BA4BE2A8-B0A4-4B91-AFEB-D5A9BD203DE8}"/>
-              </a:ext>
-            </a:extLst>
-          </p:cNvPr>
-          <p:cNvSpPr>
-            <a:spLocks noGrp="1"/>
-          </p:cNvSpPr>
-          <p:nvPr>
-            <p:ph idx="1"/>
-          </p:nvPr>
-        </p:nvSpPr>
-        <p:spPr/>
-        <p:txBody>
-          <a:bodyPr/>
-          <a:lstStyle/>
-          <a:p>
-            <a:endParaRPr lang="ko-KR" altLang="en-US"/>
           </a:p>
         </p:txBody>
       </p:sp>
     </p:spTree>
     <p:extLst>
       <p:ext uri="{BB962C8B-B14F-4D97-AF65-F5344CB8AC3E}">
-        <p14:creationId xmlns:p14="http://schemas.microsoft.com/office/powerpoint/2010/main" val="1918910412"/>
+        <p14:creationId xmlns:p14="http://schemas.microsoft.com/office/powerpoint/2010/main" val="324205520"/>
       </p:ext>
     </p:extLst>
   </p:cSld>

</xml_diff>

<commit_message>
AWS EC2 - Filezilla 권한주는 방법
</commit_message>
<xml_diff>
--- a/AWS.pptx
+++ b/AWS.pptx
@@ -13,6 +13,8 @@
     <p:sldId id="262" r:id="rId7"/>
     <p:sldId id="264" r:id="rId8"/>
     <p:sldId id="265" r:id="rId9"/>
+    <p:sldId id="266" r:id="rId10"/>
+    <p:sldId id="267" r:id="rId11"/>
   </p:sldIdLst>
   <p:sldSz cx="12192000" cy="6858000"/>
   <p:notesSz cx="6858000" cy="9144000"/>
@@ -266,7 +268,7 @@
           <a:p>
             <a:fld id="{A25D2F2F-5726-4117-80B0-B4948D098890}" type="datetimeFigureOut">
               <a:rPr lang="ko-KR" altLang="en-US" smtClean="0"/>
-              <a:t>2019-07-14</a:t>
+              <a:t>2019-07-24</a:t>
             </a:fld>
             <a:endParaRPr lang="ko-KR" altLang="en-US"/>
           </a:p>
@@ -464,7 +466,7 @@
           <a:p>
             <a:fld id="{A25D2F2F-5726-4117-80B0-B4948D098890}" type="datetimeFigureOut">
               <a:rPr lang="ko-KR" altLang="en-US" smtClean="0"/>
-              <a:t>2019-07-14</a:t>
+              <a:t>2019-07-24</a:t>
             </a:fld>
             <a:endParaRPr lang="ko-KR" altLang="en-US"/>
           </a:p>
@@ -672,7 +674,7 @@
           <a:p>
             <a:fld id="{A25D2F2F-5726-4117-80B0-B4948D098890}" type="datetimeFigureOut">
               <a:rPr lang="ko-KR" altLang="en-US" smtClean="0"/>
-              <a:t>2019-07-14</a:t>
+              <a:t>2019-07-24</a:t>
             </a:fld>
             <a:endParaRPr lang="ko-KR" altLang="en-US"/>
           </a:p>
@@ -870,7 +872,7 @@
           <a:p>
             <a:fld id="{A25D2F2F-5726-4117-80B0-B4948D098890}" type="datetimeFigureOut">
               <a:rPr lang="ko-KR" altLang="en-US" smtClean="0"/>
-              <a:t>2019-07-14</a:t>
+              <a:t>2019-07-24</a:t>
             </a:fld>
             <a:endParaRPr lang="ko-KR" altLang="en-US"/>
           </a:p>
@@ -1145,7 +1147,7 @@
           <a:p>
             <a:fld id="{A25D2F2F-5726-4117-80B0-B4948D098890}" type="datetimeFigureOut">
               <a:rPr lang="ko-KR" altLang="en-US" smtClean="0"/>
-              <a:t>2019-07-14</a:t>
+              <a:t>2019-07-24</a:t>
             </a:fld>
             <a:endParaRPr lang="ko-KR" altLang="en-US"/>
           </a:p>
@@ -1410,7 +1412,7 @@
           <a:p>
             <a:fld id="{A25D2F2F-5726-4117-80B0-B4948D098890}" type="datetimeFigureOut">
               <a:rPr lang="ko-KR" altLang="en-US" smtClean="0"/>
-              <a:t>2019-07-14</a:t>
+              <a:t>2019-07-24</a:t>
             </a:fld>
             <a:endParaRPr lang="ko-KR" altLang="en-US"/>
           </a:p>
@@ -1822,7 +1824,7 @@
           <a:p>
             <a:fld id="{A25D2F2F-5726-4117-80B0-B4948D098890}" type="datetimeFigureOut">
               <a:rPr lang="ko-KR" altLang="en-US" smtClean="0"/>
-              <a:t>2019-07-14</a:t>
+              <a:t>2019-07-24</a:t>
             </a:fld>
             <a:endParaRPr lang="ko-KR" altLang="en-US"/>
           </a:p>
@@ -1963,7 +1965,7 @@
           <a:p>
             <a:fld id="{A25D2F2F-5726-4117-80B0-B4948D098890}" type="datetimeFigureOut">
               <a:rPr lang="ko-KR" altLang="en-US" smtClean="0"/>
-              <a:t>2019-07-14</a:t>
+              <a:t>2019-07-24</a:t>
             </a:fld>
             <a:endParaRPr lang="ko-KR" altLang="en-US"/>
           </a:p>
@@ -2076,7 +2078,7 @@
           <a:p>
             <a:fld id="{A25D2F2F-5726-4117-80B0-B4948D098890}" type="datetimeFigureOut">
               <a:rPr lang="ko-KR" altLang="en-US" smtClean="0"/>
-              <a:t>2019-07-14</a:t>
+              <a:t>2019-07-24</a:t>
             </a:fld>
             <a:endParaRPr lang="ko-KR" altLang="en-US"/>
           </a:p>
@@ -2387,7 +2389,7 @@
           <a:p>
             <a:fld id="{A25D2F2F-5726-4117-80B0-B4948D098890}" type="datetimeFigureOut">
               <a:rPr lang="ko-KR" altLang="en-US" smtClean="0"/>
-              <a:t>2019-07-14</a:t>
+              <a:t>2019-07-24</a:t>
             </a:fld>
             <a:endParaRPr lang="ko-KR" altLang="en-US"/>
           </a:p>
@@ -2675,7 +2677,7 @@
           <a:p>
             <a:fld id="{A25D2F2F-5726-4117-80B0-B4948D098890}" type="datetimeFigureOut">
               <a:rPr lang="ko-KR" altLang="en-US" smtClean="0"/>
-              <a:t>2019-07-14</a:t>
+              <a:t>2019-07-24</a:t>
             </a:fld>
             <a:endParaRPr lang="ko-KR" altLang="en-US"/>
           </a:p>
@@ -2916,7 +2918,7 @@
           <a:p>
             <a:fld id="{A25D2F2F-5726-4117-80B0-B4948D098890}" type="datetimeFigureOut">
               <a:rPr lang="ko-KR" altLang="en-US" smtClean="0"/>
-              <a:t>2019-07-14</a:t>
+              <a:t>2019-07-24</a:t>
             </a:fld>
             <a:endParaRPr lang="ko-KR" altLang="en-US"/>
           </a:p>
@@ -3400,6 +3402,227 @@
 </p:sld>
 </file>
 
+<file path=ppt/slides/slide10.xml><?xml version="1.0" encoding="utf-8"?>
+<p:sld xmlns:a="http://schemas.openxmlformats.org/drawingml/2006/main" xmlns:r="http://schemas.openxmlformats.org/officeDocument/2006/relationships" xmlns:p="http://schemas.openxmlformats.org/presentationml/2006/main">
+  <p:cSld>
+    <p:spTree>
+      <p:nvGrpSpPr>
+        <p:cNvPr id="1" name=""/>
+        <p:cNvGrpSpPr/>
+        <p:nvPr/>
+      </p:nvGrpSpPr>
+      <p:grpSpPr>
+        <a:xfrm>
+          <a:off x="0" y="0"/>
+          <a:ext cx="0" cy="0"/>
+          <a:chOff x="0" y="0"/>
+          <a:chExt cx="0" cy="0"/>
+        </a:xfrm>
+      </p:grpSpPr>
+      <p:sp>
+        <p:nvSpPr>
+          <p:cNvPr id="2" name="제목 1">
+            <a:extLst>
+              <a:ext uri="{FF2B5EF4-FFF2-40B4-BE49-F238E27FC236}">
+                <a16:creationId xmlns:a16="http://schemas.microsoft.com/office/drawing/2014/main" id="{7A1A84BA-7F88-461F-8861-D94F418368A5}"/>
+              </a:ext>
+            </a:extLst>
+          </p:cNvPr>
+          <p:cNvSpPr>
+            <a:spLocks noGrp="1"/>
+          </p:cNvSpPr>
+          <p:nvPr>
+            <p:ph type="title"/>
+          </p:nvPr>
+        </p:nvSpPr>
+        <p:spPr>
+          <a:xfrm>
+            <a:off x="838200" y="365125"/>
+            <a:ext cx="10515600" cy="2001556"/>
+          </a:xfrm>
+        </p:spPr>
+        <p:txBody>
+          <a:bodyPr>
+            <a:normAutofit/>
+          </a:bodyPr>
+          <a:lstStyle/>
+          <a:p>
+            <a:r>
+              <a:rPr lang="en-US" altLang="ko-KR"/>
+              <a:t>Filezilla  </a:t>
+            </a:r>
+            <a:r>
+              <a:rPr lang="ko-KR" altLang="en-US"/>
+              <a:t>오류</a:t>
+            </a:r>
+            <a:br>
+              <a:rPr lang="en-US" altLang="ko-KR"/>
+            </a:br>
+            <a:r>
+              <a:rPr lang="en-US" altLang="ko-KR"/>
+              <a:t>set attrs for /var/www/html/index.html: permission denied</a:t>
+            </a:r>
+            <a:endParaRPr lang="ko-KR" altLang="en-US"/>
+          </a:p>
+        </p:txBody>
+      </p:sp>
+      <p:sp>
+        <p:nvSpPr>
+          <p:cNvPr id="3" name="내용 개체 틀 2">
+            <a:extLst>
+              <a:ext uri="{FF2B5EF4-FFF2-40B4-BE49-F238E27FC236}">
+                <a16:creationId xmlns:a16="http://schemas.microsoft.com/office/drawing/2014/main" id="{A21AFEF0-58C7-464F-A496-166294C2D0D3}"/>
+              </a:ext>
+            </a:extLst>
+          </p:cNvPr>
+          <p:cNvSpPr>
+            <a:spLocks noGrp="1"/>
+          </p:cNvSpPr>
+          <p:nvPr>
+            <p:ph idx="1"/>
+          </p:nvPr>
+        </p:nvSpPr>
+        <p:spPr>
+          <a:xfrm>
+            <a:off x="838200" y="2366681"/>
+            <a:ext cx="10515600" cy="4491319"/>
+          </a:xfrm>
+        </p:spPr>
+        <p:txBody>
+          <a:bodyPr/>
+          <a:lstStyle/>
+          <a:p>
+            <a:endParaRPr lang="en-US" altLang="ko-KR"/>
+          </a:p>
+          <a:p>
+            <a:r>
+              <a:rPr lang="en-US" altLang="ko-KR"/>
+              <a:t>AWS EC2 </a:t>
+            </a:r>
+            <a:r>
+              <a:rPr lang="ko-KR" altLang="en-US"/>
+              <a:t>인스턴스에 </a:t>
+            </a:r>
+            <a:r>
+              <a:rPr lang="en-US" altLang="ko-KR"/>
+              <a:t>Filezilla</a:t>
+            </a:r>
+            <a:r>
+              <a:rPr lang="ko-KR" altLang="en-US"/>
+              <a:t>로 파일 업로드 할때</a:t>
+            </a:r>
+            <a:r>
+              <a:rPr lang="en-US" altLang="ko-KR"/>
+              <a:t>	</a:t>
+            </a:r>
+            <a:r>
+              <a:rPr lang="ko-KR" altLang="en-US"/>
+              <a:t>권한니 없어서 나타나는 오류이다</a:t>
+            </a:r>
+            <a:r>
+              <a:rPr lang="en-US" altLang="ko-KR"/>
+              <a:t>. </a:t>
+            </a:r>
+          </a:p>
+          <a:p>
+            <a:r>
+              <a:rPr lang="ko-KR" altLang="en-US"/>
+              <a:t>해결방법 </a:t>
+            </a:r>
+            <a:r>
+              <a:rPr lang="en-US" altLang="ko-KR"/>
+              <a:t>1. Filezilla </a:t>
+            </a:r>
+            <a:r>
+              <a:rPr lang="ko-KR" altLang="en-US"/>
+              <a:t>에서 폴더 권하는을 변경해준다</a:t>
+            </a:r>
+            <a:r>
+              <a:rPr lang="en-US" altLang="ko-KR"/>
+              <a:t>. </a:t>
+            </a:r>
+            <a:br>
+              <a:rPr lang="en-US" altLang="ko-KR"/>
+            </a:br>
+            <a:r>
+              <a:rPr lang="en-US" altLang="ko-KR"/>
+              <a:t>                (</a:t>
+            </a:r>
+            <a:r>
+              <a:rPr lang="ko-KR" altLang="en-US"/>
+              <a:t>하지만</a:t>
+            </a:r>
+            <a:r>
+              <a:rPr lang="en-US" altLang="ko-KR"/>
+              <a:t>. </a:t>
+            </a:r>
+            <a:r>
+              <a:rPr lang="ko-KR" altLang="en-US"/>
+              <a:t>상위폴더도 모두 건들여야해서 복잡하다</a:t>
+            </a:r>
+            <a:r>
+              <a:rPr lang="en-US" altLang="ko-KR"/>
+              <a:t>.</a:t>
+            </a:r>
+          </a:p>
+          <a:p>
+            <a:r>
+              <a:rPr lang="en-US" altLang="ko-KR"/>
+              <a:t>             2. putty</a:t>
+            </a:r>
+            <a:r>
+              <a:rPr lang="ko-KR" altLang="en-US"/>
+              <a:t> 로 접속하여 </a:t>
+            </a:r>
+            <a:r>
+              <a:rPr lang="en-US" altLang="ko-KR"/>
+              <a:t>root </a:t>
+            </a:r>
+            <a:r>
+              <a:rPr lang="ko-KR" altLang="en-US"/>
+              <a:t>계정으로 들어가거나 </a:t>
+            </a:r>
+            <a:r>
+              <a:rPr lang="en-US" altLang="ko-KR"/>
+              <a:t>sudo</a:t>
+            </a:r>
+            <a:br>
+              <a:rPr lang="en-US" altLang="ko-KR"/>
+            </a:br>
+            <a:r>
+              <a:rPr lang="en-US" altLang="ko-KR"/>
+              <a:t>                </a:t>
+            </a:r>
+            <a:r>
+              <a:rPr lang="ko-KR" altLang="en-US"/>
+              <a:t>명령어를 사용하여 권한을 변경한다</a:t>
+            </a:r>
+            <a:r>
+              <a:rPr lang="en-US" altLang="ko-KR"/>
+              <a:t>.</a:t>
+            </a:r>
+          </a:p>
+          <a:p>
+            <a:r>
+              <a:rPr lang="en-US" altLang="ko-KR"/>
+              <a:t>                ex)sudo chmod 777 /var/www/html</a:t>
+            </a:r>
+          </a:p>
+        </p:txBody>
+      </p:sp>
+    </p:spTree>
+    <p:extLst>
+      <p:ext uri="{BB962C8B-B14F-4D97-AF65-F5344CB8AC3E}">
+        <p14:creationId xmlns:p14="http://schemas.microsoft.com/office/powerpoint/2010/main" val="2263217817"/>
+      </p:ext>
+    </p:extLst>
+  </p:cSld>
+  <p:clrMapOvr>
+    <a:masterClrMapping/>
+  </p:clrMapOvr>
+</p:sld>
+</file>
+
 <file path=ppt/slides/slide2.xml><?xml version="1.0" encoding="utf-8"?>
 <p:sld xmlns:a="http://schemas.openxmlformats.org/drawingml/2006/main" xmlns:r="http://schemas.openxmlformats.org/officeDocument/2006/relationships" xmlns:p="http://schemas.openxmlformats.org/presentationml/2006/main">
   <p:cSld>
@@ -4683,6 +4906,150 @@
     <p:extLst>
       <p:ext uri="{BB962C8B-B14F-4D97-AF65-F5344CB8AC3E}">
         <p14:creationId xmlns:p14="http://schemas.microsoft.com/office/powerpoint/2010/main" val="1064912524"/>
+      </p:ext>
+    </p:extLst>
+  </p:cSld>
+  <p:clrMapOvr>
+    <a:masterClrMapping/>
+  </p:clrMapOvr>
+</p:sld>
+</file>
+
+<file path=ppt/slides/slide9.xml><?xml version="1.0" encoding="utf-8"?>
+<p:sld xmlns:a="http://schemas.openxmlformats.org/drawingml/2006/main" xmlns:r="http://schemas.openxmlformats.org/officeDocument/2006/relationships" xmlns:p="http://schemas.openxmlformats.org/presentationml/2006/main">
+  <p:cSld>
+    <p:spTree>
+      <p:nvGrpSpPr>
+        <p:cNvPr id="1" name=""/>
+        <p:cNvGrpSpPr/>
+        <p:nvPr/>
+      </p:nvGrpSpPr>
+      <p:grpSpPr>
+        <a:xfrm>
+          <a:off x="0" y="0"/>
+          <a:ext cx="0" cy="0"/>
+          <a:chOff x="0" y="0"/>
+          <a:chExt cx="0" cy="0"/>
+        </a:xfrm>
+      </p:grpSpPr>
+      <p:sp>
+        <p:nvSpPr>
+          <p:cNvPr id="2" name="제목 1">
+            <a:extLst>
+              <a:ext uri="{FF2B5EF4-FFF2-40B4-BE49-F238E27FC236}">
+                <a16:creationId xmlns:a16="http://schemas.microsoft.com/office/drawing/2014/main" id="{151B0413-688F-4C86-A93A-FD64A6101E6B}"/>
+              </a:ext>
+            </a:extLst>
+          </p:cNvPr>
+          <p:cNvSpPr>
+            <a:spLocks noGrp="1"/>
+          </p:cNvSpPr>
+          <p:nvPr>
+            <p:ph type="title"/>
+          </p:nvPr>
+        </p:nvSpPr>
+        <p:spPr/>
+        <p:txBody>
+          <a:bodyPr/>
+          <a:lstStyle/>
+          <a:p>
+            <a:r>
+              <a:rPr lang="en-US" altLang="ko-KR"/>
+              <a:t>Putty connection timed out </a:t>
+            </a:r>
+            <a:r>
+              <a:rPr lang="ko-KR" altLang="en-US"/>
+              <a:t>오류</a:t>
+            </a:r>
+          </a:p>
+        </p:txBody>
+      </p:sp>
+      <p:sp>
+        <p:nvSpPr>
+          <p:cNvPr id="3" name="내용 개체 틀 2">
+            <a:extLst>
+              <a:ext uri="{FF2B5EF4-FFF2-40B4-BE49-F238E27FC236}">
+                <a16:creationId xmlns:a16="http://schemas.microsoft.com/office/drawing/2014/main" id="{88C52F64-9801-415C-B0F4-3B8655B512B0}"/>
+              </a:ext>
+            </a:extLst>
+          </p:cNvPr>
+          <p:cNvSpPr>
+            <a:spLocks noGrp="1"/>
+          </p:cNvSpPr>
+          <p:nvPr>
+            <p:ph idx="1"/>
+          </p:nvPr>
+        </p:nvSpPr>
+        <p:spPr/>
+        <p:txBody>
+          <a:bodyPr/>
+          <a:lstStyle/>
+          <a:p>
+            <a:r>
+              <a:rPr lang="en-US" altLang="ko-KR"/>
+              <a:t>AWS EC2 </a:t>
+            </a:r>
+            <a:r>
+              <a:rPr lang="ko-KR" altLang="en-US"/>
+              <a:t>에 보안 보안그룹 에서 인바운드 편집으로 </a:t>
+            </a:r>
+            <a:r>
+              <a:rPr lang="en-US" altLang="ko-KR"/>
+              <a:t>SSH </a:t>
+            </a:r>
+            <a:r>
+              <a:rPr lang="ko-KR" altLang="en-US"/>
+              <a:t>소스 값 </a:t>
+            </a:r>
+            <a:r>
+              <a:rPr lang="en-US" altLang="ko-KR"/>
+              <a:t>(</a:t>
+            </a:r>
+            <a:r>
+              <a:rPr lang="ko-KR" altLang="en-US"/>
+              <a:t>트래픽 값</a:t>
+            </a:r>
+            <a:r>
+              <a:rPr lang="en-US" altLang="ko-KR"/>
+              <a:t>) </a:t>
+            </a:r>
+            <a:r>
+              <a:rPr lang="ko-KR" altLang="en-US"/>
+              <a:t>이 맞지않아서 연결되지않는 오류이다</a:t>
+            </a:r>
+            <a:r>
+              <a:rPr lang="en-US" altLang="ko-KR"/>
+              <a:t>. </a:t>
+            </a:r>
+          </a:p>
+          <a:p>
+            <a:endParaRPr lang="en-US" altLang="ko-KR"/>
+          </a:p>
+          <a:p>
+            <a:r>
+              <a:rPr lang="ko-KR" altLang="en-US"/>
+              <a:t>해결방법은 소스값을 </a:t>
+            </a:r>
+            <a:r>
+              <a:rPr lang="en-US" altLang="ko-KR"/>
+              <a:t>My IP </a:t>
+            </a:r>
+            <a:r>
+              <a:rPr lang="ko-KR" altLang="en-US"/>
+              <a:t>로 변경해주면 다시 연결된다</a:t>
+            </a:r>
+            <a:r>
+              <a:rPr lang="en-US" altLang="ko-KR"/>
+              <a:t>.</a:t>
+            </a:r>
+            <a:endParaRPr lang="ko-KR" altLang="en-US"/>
+          </a:p>
+        </p:txBody>
+      </p:sp>
+    </p:spTree>
+    <p:extLst>
+      <p:ext uri="{BB962C8B-B14F-4D97-AF65-F5344CB8AC3E}">
+        <p14:creationId xmlns:p14="http://schemas.microsoft.com/office/powerpoint/2010/main" val="1104184373"/>
       </p:ext>
     </p:extLst>
   </p:cSld>

</xml_diff>